<commit_message>
Updated day 3 slides
</commit_message>
<xml_diff>
--- a/slides/Tag-3_1-GitOps.pptx
+++ b/slides/Tag-3_1-GitOps.pptx
@@ -9311,6 +9311,12 @@
             </a:r>
           </a:p>
           <a:p>
+            <a:pPr marL="0" indent="0">
+              <a:buNone/>
+            </a:pPr>
+            <a:endParaRPr lang="de-DE" altLang="de-DE" b="1" dirty="0"/>
+          </a:p>
+          <a:p>
             <a:pPr>
               <a:buFont typeface="Arial" panose="020B0604020202020204" pitchFamily="34" charset="0"/>
               <a:buChar char="•"/>
@@ -9766,6 +9772,12 @@
             </a:r>
           </a:p>
           <a:p>
+            <a:pPr marL="0" indent="0">
+              <a:buNone/>
+            </a:pPr>
+            <a:endParaRPr lang="de-DE" b="1" dirty="0"/>
+          </a:p>
+          <a:p>
             <a:pPr>
               <a:buFont typeface="Arial" panose="020B0604020202020204" pitchFamily="34" charset="0"/>
               <a:buChar char="•"/>
@@ -9773,24 +9785,6 @@
             <a:r>
               <a:rPr lang="de-DE" dirty="0"/>
               <a:t>Workflow für Anwendungsbereitstellung</a:t>
-            </a:r>
-          </a:p>
-          <a:p>
-            <a:pPr>
-              <a:buFont typeface="Arial" panose="020B0604020202020204" pitchFamily="34" charset="0"/>
-              <a:buChar char="•"/>
-            </a:pPr>
-            <a:r>
-              <a:rPr lang="de-DE" dirty="0"/>
-              <a:t>Transparenz (</a:t>
-            </a:r>
-            <a:r>
-              <a:rPr lang="de-DE" dirty="0" err="1"/>
-              <a:t>git</a:t>
-            </a:r>
-            <a:r>
-              <a:rPr lang="de-DE" dirty="0"/>
-              <a:t>)</a:t>
             </a:r>
           </a:p>
           <a:p>
@@ -10072,7 +10066,7 @@
 </file>
 
 <file path=ppt/slides/slide15.xml><?xml version="1.0" encoding="utf-8"?>
-<p:sld xmlns:a="http://schemas.openxmlformats.org/drawingml/2006/main" xmlns:r="http://schemas.openxmlformats.org/officeDocument/2006/relationships" xmlns:p="http://schemas.openxmlformats.org/presentationml/2006/main">
+<p:sld xmlns:a="http://schemas.openxmlformats.org/drawingml/2006/main" xmlns:r="http://schemas.openxmlformats.org/officeDocument/2006/relationships" xmlns:p="http://schemas.openxmlformats.org/presentationml/2006/main" show="0">
   <p:cSld>
     <p:spTree>
       <p:nvGrpSpPr>
@@ -10384,7 +10378,7 @@
 </file>
 
 <file path=ppt/slides/slide16.xml><?xml version="1.0" encoding="utf-8"?>
-<p:sld xmlns:a="http://schemas.openxmlformats.org/drawingml/2006/main" xmlns:r="http://schemas.openxmlformats.org/officeDocument/2006/relationships" xmlns:p="http://schemas.openxmlformats.org/presentationml/2006/main">
+<p:sld xmlns:a="http://schemas.openxmlformats.org/drawingml/2006/main" xmlns:r="http://schemas.openxmlformats.org/officeDocument/2006/relationships" xmlns:p="http://schemas.openxmlformats.org/presentationml/2006/main" show="0">
   <p:cSld>
     <p:spTree>
       <p:nvGrpSpPr>
@@ -10620,7 +10614,7 @@
 </file>
 
 <file path=ppt/slides/slide17.xml><?xml version="1.0" encoding="utf-8"?>
-<p:sld xmlns:a="http://schemas.openxmlformats.org/drawingml/2006/main" xmlns:r="http://schemas.openxmlformats.org/officeDocument/2006/relationships" xmlns:p="http://schemas.openxmlformats.org/presentationml/2006/main">
+<p:sld xmlns:a="http://schemas.openxmlformats.org/drawingml/2006/main" xmlns:r="http://schemas.openxmlformats.org/officeDocument/2006/relationships" xmlns:p="http://schemas.openxmlformats.org/presentationml/2006/main" show="0">
   <p:cSld>
     <p:spTree>
       <p:nvGrpSpPr>
@@ -11137,7 +11131,15 @@
             </a:pPr>
             <a:r>
               <a:rPr lang="de-DE" sz="2000" dirty="0"/>
-              <a:t>Neues Release?! PR in </a:t>
+              <a:t>Neues </a:t>
+            </a:r>
+            <a:r>
+              <a:rPr lang="de-DE" sz="2000" dirty="0" err="1"/>
+              <a:t>Deployment</a:t>
+            </a:r>
+            <a:r>
+              <a:rPr lang="de-DE" sz="2000" dirty="0"/>
+              <a:t>?! PR in </a:t>
             </a:r>
             <a:r>
               <a:rPr lang="de-DE" sz="2000" dirty="0" err="1"/>
@@ -11250,7 +11252,7 @@
               <a:rPr lang="de-DE" sz="1600" dirty="0">
                 <a:sym typeface="Wingdings" panose="05000000000000000000" pitchFamily="2" charset="2"/>
               </a:rPr>
-              <a:t>-Teams nutzen weiterhin CI/CD Praktiken</a:t>
+              <a:t>-Teams nutzen weiterhin bekannte CI/CD Praktiken</a:t>
             </a:r>
             <a:endParaRPr lang="de-DE" sz="1600" dirty="0"/>
           </a:p>
@@ -12099,7 +12101,7 @@
 </file>
 
 <file path=ppt/slides/slide21.xml><?xml version="1.0" encoding="utf-8"?>
-<p:sld xmlns:a="http://schemas.openxmlformats.org/drawingml/2006/main" xmlns:r="http://schemas.openxmlformats.org/officeDocument/2006/relationships" xmlns:p="http://schemas.openxmlformats.org/presentationml/2006/main">
+<p:sld xmlns:a="http://schemas.openxmlformats.org/drawingml/2006/main" xmlns:r="http://schemas.openxmlformats.org/officeDocument/2006/relationships" xmlns:p="http://schemas.openxmlformats.org/presentationml/2006/main" show="0">
   <p:cSld>
     <p:spTree>
       <p:nvGrpSpPr>
@@ -17018,7 +17020,7 @@
             </a:pPr>
             <a:r>
               <a:rPr lang="de-DE" dirty="0"/>
-              <a:t>Rolle des CI Servers</a:t>
+              <a:t>Übliche Rolle des CI Servers</a:t>
             </a:r>
           </a:p>
           <a:p>
@@ -18430,7 +18432,7 @@
             </a:pPr>
             <a:r>
               <a:rPr lang="de-DE" b="1" kern="0" dirty="0"/>
-              <a:t>Rolle des CI Servers</a:t>
+              <a:t>Übliche Rolle des CI Servers</a:t>
             </a:r>
           </a:p>
           <a:p>
@@ -25970,6 +25972,12 @@
             </a:r>
           </a:p>
           <a:p>
+            <a:pPr marL="0" indent="0">
+              <a:buNone/>
+            </a:pPr>
+            <a:endParaRPr lang="de-DE" b="1" dirty="0"/>
+          </a:p>
+          <a:p>
             <a:pPr>
               <a:buFont typeface="Arial" panose="020B0604020202020204" pitchFamily="34" charset="0"/>
               <a:buChar char="•"/>
@@ -26234,6 +26242,12 @@
               <a:rPr lang="de-DE" b="1" dirty="0"/>
               <a:t>Abschließende Herausforderungen</a:t>
             </a:r>
+          </a:p>
+          <a:p>
+            <a:pPr marL="0" indent="0">
+              <a:buNone/>
+            </a:pPr>
+            <a:endParaRPr lang="de-DE" b="1" dirty="0"/>
           </a:p>
           <a:p>
             <a:pPr>
@@ -27163,7 +27177,7 @@
               <a:buAutoNum type="arabicPeriod"/>
             </a:pPr>
             <a:r>
-              <a:rPr lang="de-DE" b="1" dirty="0"/>
+              <a:rPr lang="de-DE" dirty="0"/>
               <a:t>Deklarativ (statt programmatisch)</a:t>
             </a:r>
           </a:p>
@@ -27173,7 +27187,7 @@
               <a:buAutoNum type="arabicPeriod"/>
             </a:pPr>
             <a:r>
-              <a:rPr lang="de-DE" b="1" dirty="0"/>
+              <a:rPr lang="de-DE" dirty="0"/>
               <a:t>Versioniert und unveränderlich</a:t>
             </a:r>
           </a:p>
@@ -27183,14 +27197,14 @@
               <a:buAutoNum type="arabicPeriod"/>
             </a:pPr>
             <a:r>
-              <a:rPr lang="de-DE" b="1" dirty="0"/>
+              <a:rPr lang="de-DE" dirty="0"/>
               <a:t>Automatische </a:t>
             </a:r>
             <a:r>
-              <a:rPr lang="de-DE" b="1" dirty="0" err="1"/>
+              <a:rPr lang="de-DE" dirty="0" err="1"/>
               <a:t>Pulls</a:t>
             </a:r>
-            <a:endParaRPr lang="de-DE" b="1" dirty="0"/>
+            <a:endParaRPr lang="de-DE" dirty="0"/>
           </a:p>
           <a:p>
             <a:pPr marL="457200" indent="-457200">
@@ -27198,7 +27212,7 @@
               <a:buAutoNum type="arabicPeriod"/>
             </a:pPr>
             <a:r>
-              <a:rPr lang="de-DE" b="1" dirty="0"/>
+              <a:rPr lang="de-DE" dirty="0"/>
               <a:t>Kontinuierliche Anpassung</a:t>
             </a:r>
           </a:p>

</xml_diff>